<commit_message>
Updated to include Reliability base implementation
</commit_message>
<xml_diff>
--- a/Figures/Layering_Diagram.pptx
+++ b/Figures/Layering_Diagram.pptx
@@ -104,6 +104,11 @@
       </a:defRPr>
     </a:lvl9pPr>
   </p:defaultTextStyle>
+  <p:extLst>
+    <p:ext uri="{EFAFB233-063F-42B5-8137-9DF3F51BA10A}">
+      <p15:sldGuideLst xmlns:p15="http://schemas.microsoft.com/office/powerpoint/2012/main"/>
+    </p:ext>
+  </p:extLst>
 </p:presentation>
 </file>
 
@@ -254,7 +259,7 @@
           <a:p>
             <a:fld id="{250D7AFC-5571-7644-8AD7-E56925B86731}" type="datetimeFigureOut">
               <a:rPr lang="en-US" smtClean="0"/>
-              <a:t>11/26/19</a:t>
+              <a:t>12/3/19</a:t>
             </a:fld>
             <a:endParaRPr lang="en-US"/>
           </a:p>
@@ -452,7 +457,7 @@
           <a:p>
             <a:fld id="{250D7AFC-5571-7644-8AD7-E56925B86731}" type="datetimeFigureOut">
               <a:rPr lang="en-US" smtClean="0"/>
-              <a:t>11/26/19</a:t>
+              <a:t>12/3/19</a:t>
             </a:fld>
             <a:endParaRPr lang="en-US"/>
           </a:p>
@@ -660,7 +665,7 @@
           <a:p>
             <a:fld id="{250D7AFC-5571-7644-8AD7-E56925B86731}" type="datetimeFigureOut">
               <a:rPr lang="en-US" smtClean="0"/>
-              <a:t>11/26/19</a:t>
+              <a:t>12/3/19</a:t>
             </a:fld>
             <a:endParaRPr lang="en-US"/>
           </a:p>
@@ -858,7 +863,7 @@
           <a:p>
             <a:fld id="{250D7AFC-5571-7644-8AD7-E56925B86731}" type="datetimeFigureOut">
               <a:rPr lang="en-US" smtClean="0"/>
-              <a:t>11/26/19</a:t>
+              <a:t>12/3/19</a:t>
             </a:fld>
             <a:endParaRPr lang="en-US"/>
           </a:p>
@@ -1133,7 +1138,7 @@
           <a:p>
             <a:fld id="{250D7AFC-5571-7644-8AD7-E56925B86731}" type="datetimeFigureOut">
               <a:rPr lang="en-US" smtClean="0"/>
-              <a:t>11/26/19</a:t>
+              <a:t>12/3/19</a:t>
             </a:fld>
             <a:endParaRPr lang="en-US"/>
           </a:p>
@@ -1398,7 +1403,7 @@
           <a:p>
             <a:fld id="{250D7AFC-5571-7644-8AD7-E56925B86731}" type="datetimeFigureOut">
               <a:rPr lang="en-US" smtClean="0"/>
-              <a:t>11/26/19</a:t>
+              <a:t>12/3/19</a:t>
             </a:fld>
             <a:endParaRPr lang="en-US"/>
           </a:p>
@@ -1810,7 +1815,7 @@
           <a:p>
             <a:fld id="{250D7AFC-5571-7644-8AD7-E56925B86731}" type="datetimeFigureOut">
               <a:rPr lang="en-US" smtClean="0"/>
-              <a:t>11/26/19</a:t>
+              <a:t>12/3/19</a:t>
             </a:fld>
             <a:endParaRPr lang="en-US"/>
           </a:p>
@@ -1951,7 +1956,7 @@
           <a:p>
             <a:fld id="{250D7AFC-5571-7644-8AD7-E56925B86731}" type="datetimeFigureOut">
               <a:rPr lang="en-US" smtClean="0"/>
-              <a:t>11/26/19</a:t>
+              <a:t>12/3/19</a:t>
             </a:fld>
             <a:endParaRPr lang="en-US"/>
           </a:p>
@@ -2064,7 +2069,7 @@
           <a:p>
             <a:fld id="{250D7AFC-5571-7644-8AD7-E56925B86731}" type="datetimeFigureOut">
               <a:rPr lang="en-US" smtClean="0"/>
-              <a:t>11/26/19</a:t>
+              <a:t>12/3/19</a:t>
             </a:fld>
             <a:endParaRPr lang="en-US"/>
           </a:p>
@@ -2375,7 +2380,7 @@
           <a:p>
             <a:fld id="{250D7AFC-5571-7644-8AD7-E56925B86731}" type="datetimeFigureOut">
               <a:rPr lang="en-US" smtClean="0"/>
-              <a:t>11/26/19</a:t>
+              <a:t>12/3/19</a:t>
             </a:fld>
             <a:endParaRPr lang="en-US"/>
           </a:p>
@@ -2663,7 +2668,7 @@
           <a:p>
             <a:fld id="{250D7AFC-5571-7644-8AD7-E56925B86731}" type="datetimeFigureOut">
               <a:rPr lang="en-US" smtClean="0"/>
-              <a:t>11/26/19</a:t>
+              <a:t>12/3/19</a:t>
             </a:fld>
             <a:endParaRPr lang="en-US"/>
           </a:p>
@@ -2904,7 +2909,7 @@
           <a:p>
             <a:fld id="{250D7AFC-5571-7644-8AD7-E56925B86731}" type="datetimeFigureOut">
               <a:rPr lang="en-US" smtClean="0"/>
-              <a:t>11/26/19</a:t>
+              <a:t>12/3/19</a:t>
             </a:fld>
             <a:endParaRPr lang="en-US"/>
           </a:p>
@@ -3615,8 +3620,8 @@
         </p:nvSpPr>
         <p:spPr>
           <a:xfrm>
-            <a:off x="5515852" y="588762"/>
-            <a:ext cx="1160289" cy="369332"/>
+            <a:off x="5138515" y="682266"/>
+            <a:ext cx="1914955" cy="369332"/>
           </a:xfrm>
           <a:prstGeom prst="rect">
             <a:avLst/>
@@ -3632,7 +3637,7 @@
             <a:pPr algn="ctr"/>
             <a:r>
               <a:rPr lang="en-US" dirty="0"/>
-              <a:t>Functions</a:t>
+              <a:t>System Functions</a:t>
             </a:r>
           </a:p>
         </p:txBody>
@@ -3651,8 +3656,8 @@
         </p:nvSpPr>
         <p:spPr>
           <a:xfrm>
-            <a:off x="5515851" y="1664879"/>
-            <a:ext cx="1160289" cy="369332"/>
+            <a:off x="5149018" y="1629012"/>
+            <a:ext cx="1904452" cy="369332"/>
           </a:xfrm>
           <a:prstGeom prst="rect">
             <a:avLst/>
@@ -3668,7 +3673,7 @@
             <a:pPr algn="ctr"/>
             <a:r>
               <a:rPr lang="en-US" dirty="0"/>
-              <a:t>Tasks</a:t>
+              <a:t>System Tasks</a:t>
             </a:r>
           </a:p>
         </p:txBody>
@@ -3687,8 +3692,8 @@
         </p:nvSpPr>
         <p:spPr>
           <a:xfrm>
-            <a:off x="5346158" y="2534274"/>
-            <a:ext cx="1499673" cy="369332"/>
+            <a:off x="5037903" y="2577182"/>
+            <a:ext cx="2105676" cy="369332"/>
           </a:xfrm>
           <a:prstGeom prst="rect">
             <a:avLst/>
@@ -3704,7 +3709,7 @@
             <a:pPr algn="ctr"/>
             <a:r>
               <a:rPr lang="en-US" dirty="0"/>
-              <a:t>Algorithms</a:t>
+              <a:t>System Algorithms</a:t>
             </a:r>
           </a:p>
         </p:txBody>
@@ -3723,8 +3728,8 @@
         </p:nvSpPr>
         <p:spPr>
           <a:xfrm>
-            <a:off x="5346158" y="3481020"/>
-            <a:ext cx="1499673" cy="369332"/>
+            <a:off x="5032647" y="3515464"/>
+            <a:ext cx="2116187" cy="369332"/>
           </a:xfrm>
           <a:prstGeom prst="rect">
             <a:avLst/>
@@ -3740,7 +3745,7 @@
             <a:pPr algn="ctr"/>
             <a:r>
               <a:rPr lang="en-US" dirty="0"/>
-              <a:t>Information</a:t>
+              <a:t>System Information</a:t>
             </a:r>
           </a:p>
         </p:txBody>
@@ -3759,7 +3764,7 @@
         </p:nvSpPr>
         <p:spPr>
           <a:xfrm>
-            <a:off x="5099946" y="4505118"/>
+            <a:off x="5094692" y="4479787"/>
             <a:ext cx="1992095" cy="369332"/>
           </a:xfrm>
           <a:prstGeom prst="rect">

</xml_diff>